<commit_message>
OptitrackTracker class finished. Needs for ITK thread integration
All the need steps for ITK thread integration are taken from mitk::OptitrackTracker class as a model.

TO DO:
ITK thread support
Change some Set/Get using ITK
Develop OptitrackTool class for correct working
</commit_message>
<xml_diff>
--- a/Laubrary/doc/Documentation_StateMachine.pptx
+++ b/Laubrary/doc/Documentation_StateMachine.pptx
@@ -7077,6 +7077,609 @@
           </a:p>
         </p:txBody>
       </p:sp>
+      <p:cxnSp>
+        <p:nvCxnSpPr>
+          <p:cNvPr id="154" name="153 Conector curvado"/>
+          <p:cNvCxnSpPr>
+            <a:stCxn id="125" idx="0"/>
+            <a:endCxn id="42" idx="1"/>
+          </p:cNvCxnSpPr>
+          <p:nvPr/>
+        </p:nvCxnSpPr>
+        <p:spPr>
+          <a:xfrm flipV="1">
+            <a:off x="4000975" y="3726590"/>
+            <a:ext cx="829423" cy="152796"/>
+          </a:xfrm>
+          <a:prstGeom prst="curvedConnector3">
+            <a:avLst>
+              <a:gd name="adj1" fmla="val 50000"/>
+            </a:avLst>
+          </a:prstGeom>
+          <a:ln w="19050">
+            <a:tailEnd type="arrow"/>
+          </a:ln>
+        </p:spPr>
+        <p:style>
+          <a:lnRef idx="1">
+            <a:schemeClr val="accent2"/>
+          </a:lnRef>
+          <a:fillRef idx="0">
+            <a:schemeClr val="accent2"/>
+          </a:fillRef>
+          <a:effectRef idx="0">
+            <a:schemeClr val="accent2"/>
+          </a:effectRef>
+          <a:fontRef idx="minor">
+            <a:schemeClr val="tx1"/>
+          </a:fontRef>
+        </p:style>
+      </p:cxnSp>
+      <p:sp>
+        <p:nvSpPr>
+          <p:cNvPr id="157" name="156 Rectángulo redondeado"/>
+          <p:cNvSpPr/>
+          <p:nvPr/>
+        </p:nvSpPr>
+        <p:spPr>
+          <a:xfrm>
+            <a:off x="112227" y="5700232"/>
+            <a:ext cx="1985023" cy="167168"/>
+          </a:xfrm>
+          <a:prstGeom prst="roundRect">
+            <a:avLst/>
+          </a:prstGeom>
+          <a:solidFill>
+            <a:schemeClr val="accent2">
+              <a:lumMod val="20000"/>
+              <a:lumOff val="80000"/>
+            </a:schemeClr>
+          </a:solidFill>
+          <a:ln>
+            <a:solidFill>
+              <a:schemeClr val="accent2"/>
+            </a:solidFill>
+          </a:ln>
+        </p:spPr>
+        <p:style>
+          <a:lnRef idx="2">
+            <a:schemeClr val="accent1">
+              <a:shade val="50000"/>
+            </a:schemeClr>
+          </a:lnRef>
+          <a:fillRef idx="1">
+            <a:schemeClr val="accent1"/>
+          </a:fillRef>
+          <a:effectRef idx="0">
+            <a:schemeClr val="accent1"/>
+          </a:effectRef>
+          <a:fontRef idx="minor">
+            <a:schemeClr val="lt1"/>
+          </a:fontRef>
+        </p:style>
+        <p:txBody>
+          <a:bodyPr rtlCol="0" anchor="ctr"/>
+          <a:lstStyle/>
+          <a:p>
+            <a:pPr algn="ctr"/>
+            <a:r>
+              <a:rPr lang="en-US" sz="800" i="1" dirty="0" err="1">
+                <a:solidFill>
+                  <a:schemeClr val="tx1"/>
+                </a:solidFill>
+              </a:rPr>
+              <a:t>AttemptingToLaunchTrackingThreadState</a:t>
+            </a:r>
+            <a:endParaRPr lang="en-US" sz="800" i="1" dirty="0">
+              <a:solidFill>
+                <a:schemeClr val="tx1"/>
+              </a:solidFill>
+            </a:endParaRPr>
+          </a:p>
+        </p:txBody>
+      </p:sp>
+      <p:sp>
+        <p:nvSpPr>
+          <p:cNvPr id="158" name="157 Redondear rectángulo de esquina del mismo lado"/>
+          <p:cNvSpPr/>
+          <p:nvPr/>
+        </p:nvSpPr>
+        <p:spPr>
+          <a:xfrm>
+            <a:off x="280024" y="6067619"/>
+            <a:ext cx="1533359" cy="166872"/>
+          </a:xfrm>
+          <a:prstGeom prst="round2SameRect">
+            <a:avLst/>
+          </a:prstGeom>
+          <a:solidFill>
+            <a:schemeClr val="accent3">
+              <a:lumMod val="20000"/>
+              <a:lumOff val="80000"/>
+            </a:schemeClr>
+          </a:solidFill>
+        </p:spPr>
+        <p:style>
+          <a:lnRef idx="2">
+            <a:schemeClr val="accent3">
+              <a:shade val="50000"/>
+            </a:schemeClr>
+          </a:lnRef>
+          <a:fillRef idx="1">
+            <a:schemeClr val="accent3"/>
+          </a:fillRef>
+          <a:effectRef idx="0">
+            <a:schemeClr val="accent3"/>
+          </a:effectRef>
+          <a:fontRef idx="minor">
+            <a:schemeClr val="lt1"/>
+          </a:fontRef>
+        </p:style>
+        <p:txBody>
+          <a:bodyPr rtlCol="0" anchor="ctr"/>
+          <a:lstStyle/>
+          <a:p>
+            <a:pPr algn="ctr"/>
+            <a:r>
+              <a:rPr lang="en-US" sz="800" dirty="0" err="1">
+                <a:solidFill>
+                  <a:schemeClr val="tx1"/>
+                </a:solidFill>
+              </a:rPr>
+              <a:t>StartTracking</a:t>
+            </a:r>
+            <a:r>
+              <a:rPr lang="en-US" sz="800" dirty="0">
+                <a:solidFill>
+                  <a:schemeClr val="tx1"/>
+                </a:solidFill>
+              </a:rPr>
+              <a:t>()</a:t>
+            </a:r>
+            <a:endParaRPr lang="en-US" sz="800" dirty="0"/>
+          </a:p>
+        </p:txBody>
+      </p:sp>
+      <p:cxnSp>
+        <p:nvCxnSpPr>
+          <p:cNvPr id="159" name="158 Conector curvado"/>
+          <p:cNvCxnSpPr>
+            <a:stCxn id="123" idx="2"/>
+            <a:endCxn id="157" idx="0"/>
+          </p:cNvCxnSpPr>
+          <p:nvPr/>
+        </p:nvCxnSpPr>
+        <p:spPr>
+          <a:xfrm rot="5400000">
+            <a:off x="1995222" y="4334033"/>
+            <a:ext cx="475716" cy="2256682"/>
+          </a:xfrm>
+          <a:prstGeom prst="curvedConnector3">
+            <a:avLst>
+              <a:gd name="adj1" fmla="val 50000"/>
+            </a:avLst>
+          </a:prstGeom>
+          <a:ln>
+            <a:tailEnd type="arrow"/>
+          </a:ln>
+        </p:spPr>
+        <p:style>
+          <a:lnRef idx="1">
+            <a:schemeClr val="accent1"/>
+          </a:lnRef>
+          <a:fillRef idx="0">
+            <a:schemeClr val="accent1"/>
+          </a:fillRef>
+          <a:effectRef idx="0">
+            <a:schemeClr val="accent1"/>
+          </a:effectRef>
+          <a:fontRef idx="minor">
+            <a:schemeClr val="tx1"/>
+          </a:fontRef>
+        </p:style>
+      </p:cxnSp>
+      <p:cxnSp>
+        <p:nvCxnSpPr>
+          <p:cNvPr id="163" name="162 Conector curvado"/>
+          <p:cNvCxnSpPr>
+            <a:stCxn id="157" idx="2"/>
+            <a:endCxn id="158" idx="3"/>
+          </p:cNvCxnSpPr>
+          <p:nvPr/>
+        </p:nvCxnSpPr>
+        <p:spPr>
+          <a:xfrm rot="5400000">
+            <a:off x="975613" y="5938492"/>
+            <a:ext cx="200219" cy="58035"/>
+          </a:xfrm>
+          <a:prstGeom prst="curvedConnector3">
+            <a:avLst>
+              <a:gd name="adj1" fmla="val 50000"/>
+            </a:avLst>
+          </a:prstGeom>
+          <a:ln>
+            <a:tailEnd type="arrow"/>
+          </a:ln>
+        </p:spPr>
+        <p:style>
+          <a:lnRef idx="1">
+            <a:schemeClr val="dk1"/>
+          </a:lnRef>
+          <a:fillRef idx="0">
+            <a:schemeClr val="dk1"/>
+          </a:fillRef>
+          <a:effectRef idx="0">
+            <a:schemeClr val="dk1"/>
+          </a:effectRef>
+          <a:fontRef idx="minor">
+            <a:schemeClr val="tx1"/>
+          </a:fontRef>
+        </p:style>
+      </p:cxnSp>
+      <p:cxnSp>
+        <p:nvCxnSpPr>
+          <p:cNvPr id="171" name="170 Conector curvado"/>
+          <p:cNvCxnSpPr>
+            <a:stCxn id="158" idx="1"/>
+            <a:endCxn id="182" idx="3"/>
+          </p:cNvCxnSpPr>
+          <p:nvPr/>
+        </p:nvCxnSpPr>
+        <p:spPr>
+          <a:xfrm rot="16200000" flipH="1">
+            <a:off x="1020505" y="6260689"/>
+            <a:ext cx="188917" cy="136519"/>
+          </a:xfrm>
+          <a:prstGeom prst="curvedConnector3">
+            <a:avLst>
+              <a:gd name="adj1" fmla="val 50000"/>
+            </a:avLst>
+          </a:prstGeom>
+          <a:ln w="19050">
+            <a:tailEnd type="arrow"/>
+          </a:ln>
+        </p:spPr>
+        <p:style>
+          <a:lnRef idx="1">
+            <a:schemeClr val="accent3"/>
+          </a:lnRef>
+          <a:fillRef idx="0">
+            <a:schemeClr val="accent3"/>
+          </a:fillRef>
+          <a:effectRef idx="0">
+            <a:schemeClr val="accent3"/>
+          </a:effectRef>
+          <a:fontRef idx="minor">
+            <a:schemeClr val="tx1"/>
+          </a:fontRef>
+        </p:style>
+      </p:cxnSp>
+      <p:cxnSp>
+        <p:nvCxnSpPr>
+          <p:cNvPr id="176" name="175 Conector curvado"/>
+          <p:cNvCxnSpPr>
+            <a:stCxn id="158" idx="0"/>
+            <a:endCxn id="123" idx="0"/>
+          </p:cNvCxnSpPr>
+          <p:nvPr/>
+        </p:nvCxnSpPr>
+        <p:spPr>
+          <a:xfrm flipV="1">
+            <a:off x="1813383" y="5072116"/>
+            <a:ext cx="1548038" cy="1078939"/>
+          </a:xfrm>
+          <a:prstGeom prst="curvedConnector4">
+            <a:avLst>
+              <a:gd name="adj1" fmla="val 34081"/>
+              <a:gd name="adj2" fmla="val 132744"/>
+            </a:avLst>
+          </a:prstGeom>
+          <a:ln w="19050">
+            <a:tailEnd type="arrow"/>
+          </a:ln>
+        </p:spPr>
+        <p:style>
+          <a:lnRef idx="1">
+            <a:schemeClr val="accent2"/>
+          </a:lnRef>
+          <a:fillRef idx="0">
+            <a:schemeClr val="accent2"/>
+          </a:fillRef>
+          <a:effectRef idx="0">
+            <a:schemeClr val="accent2"/>
+          </a:effectRef>
+          <a:fontRef idx="minor">
+            <a:schemeClr val="tx1"/>
+          </a:fontRef>
+        </p:style>
+      </p:cxnSp>
+      <p:sp>
+        <p:nvSpPr>
+          <p:cNvPr id="182" name="181 Redondear rectángulo de esquina del mismo lado"/>
+          <p:cNvSpPr/>
+          <p:nvPr/>
+        </p:nvSpPr>
+        <p:spPr>
+          <a:xfrm>
+            <a:off x="416543" y="6423408"/>
+            <a:ext cx="1533359" cy="166872"/>
+          </a:xfrm>
+          <a:prstGeom prst="round2SameRect">
+            <a:avLst/>
+          </a:prstGeom>
+          <a:solidFill>
+            <a:schemeClr val="accent3">
+              <a:lumMod val="20000"/>
+              <a:lumOff val="80000"/>
+            </a:schemeClr>
+          </a:solidFill>
+        </p:spPr>
+        <p:style>
+          <a:lnRef idx="2">
+            <a:schemeClr val="accent3">
+              <a:shade val="50000"/>
+            </a:schemeClr>
+          </a:lnRef>
+          <a:fillRef idx="1">
+            <a:schemeClr val="accent3"/>
+          </a:fillRef>
+          <a:effectRef idx="0">
+            <a:schemeClr val="accent3"/>
+          </a:effectRef>
+          <a:fontRef idx="minor">
+            <a:schemeClr val="lt1"/>
+          </a:fontRef>
+        </p:style>
+        <p:txBody>
+          <a:bodyPr rtlCol="0" anchor="ctr"/>
+          <a:lstStyle/>
+          <a:p>
+            <a:pPr algn="ctr"/>
+            <a:r>
+              <a:rPr lang="en-US" sz="800" dirty="0" err="1" smtClean="0">
+                <a:solidFill>
+                  <a:schemeClr val="tx1"/>
+                </a:solidFill>
+              </a:rPr>
+              <a:t>ThreadStartTracking</a:t>
+            </a:r>
+            <a:r>
+              <a:rPr lang="en-US" sz="800" dirty="0">
+                <a:solidFill>
+                  <a:schemeClr val="tx1"/>
+                </a:solidFill>
+              </a:rPr>
+              <a:t>()</a:t>
+            </a:r>
+            <a:endParaRPr lang="en-US" sz="800" dirty="0"/>
+          </a:p>
+        </p:txBody>
+      </p:sp>
+      <p:cxnSp>
+        <p:nvCxnSpPr>
+          <p:cNvPr id="185" name="184 Conector curvado"/>
+          <p:cNvCxnSpPr>
+            <a:stCxn id="182" idx="2"/>
+            <a:endCxn id="182" idx="1"/>
+          </p:cNvCxnSpPr>
+          <p:nvPr/>
+        </p:nvCxnSpPr>
+        <p:spPr>
+          <a:xfrm rot="10800000" flipH="1" flipV="1">
+            <a:off x="416543" y="6506844"/>
+            <a:ext cx="766680" cy="83436"/>
+          </a:xfrm>
+          <a:prstGeom prst="curvedConnector4">
+            <a:avLst>
+              <a:gd name="adj1" fmla="val -29817"/>
+              <a:gd name="adj2" fmla="val 373982"/>
+            </a:avLst>
+          </a:prstGeom>
+          <a:ln w="19050">
+            <a:tailEnd type="arrow"/>
+          </a:ln>
+        </p:spPr>
+        <p:style>
+          <a:lnRef idx="1">
+            <a:schemeClr val="accent3"/>
+          </a:lnRef>
+          <a:fillRef idx="0">
+            <a:schemeClr val="accent3"/>
+          </a:fillRef>
+          <a:effectRef idx="0">
+            <a:schemeClr val="accent3"/>
+          </a:effectRef>
+          <a:fontRef idx="minor">
+            <a:schemeClr val="tx1"/>
+          </a:fontRef>
+        </p:style>
+      </p:cxnSp>
+      <p:cxnSp>
+        <p:nvCxnSpPr>
+          <p:cNvPr id="188" name="187 Conector curvado"/>
+          <p:cNvCxnSpPr>
+            <a:stCxn id="182" idx="0"/>
+            <a:endCxn id="182" idx="1"/>
+          </p:cNvCxnSpPr>
+          <p:nvPr/>
+        </p:nvCxnSpPr>
+        <p:spPr>
+          <a:xfrm flipH="1">
+            <a:off x="1183223" y="6506844"/>
+            <a:ext cx="766679" cy="83436"/>
+          </a:xfrm>
+          <a:prstGeom prst="curvedConnector4">
+            <a:avLst>
+              <a:gd name="adj1" fmla="val -29817"/>
+              <a:gd name="adj2" fmla="val 373982"/>
+            </a:avLst>
+          </a:prstGeom>
+          <a:ln w="19050">
+            <a:tailEnd type="arrow"/>
+          </a:ln>
+        </p:spPr>
+        <p:style>
+          <a:lnRef idx="1">
+            <a:schemeClr val="accent2"/>
+          </a:lnRef>
+          <a:fillRef idx="0">
+            <a:schemeClr val="accent2"/>
+          </a:fillRef>
+          <a:effectRef idx="0">
+            <a:schemeClr val="accent2"/>
+          </a:effectRef>
+          <a:fontRef idx="minor">
+            <a:schemeClr val="tx1"/>
+          </a:fontRef>
+        </p:style>
+      </p:cxnSp>
+      <p:grpSp>
+        <p:nvGrpSpPr>
+          <p:cNvPr id="191" name="190 Grupo"/>
+          <p:cNvGrpSpPr/>
+          <p:nvPr/>
+        </p:nvGrpSpPr>
+        <p:grpSpPr>
+          <a:xfrm>
+            <a:off x="0" y="5580232"/>
+            <a:ext cx="2333662" cy="1277768"/>
+            <a:chOff x="5695541" y="4191000"/>
+            <a:chExt cx="4134259" cy="2133600"/>
+          </a:xfrm>
+        </p:grpSpPr>
+        <p:cxnSp>
+          <p:nvCxnSpPr>
+            <p:cNvPr id="192" name="191 Conector recto"/>
+            <p:cNvCxnSpPr/>
+            <p:nvPr/>
+          </p:nvCxnSpPr>
+          <p:spPr>
+            <a:xfrm>
+              <a:off x="5695541" y="4191000"/>
+              <a:ext cx="0" cy="2133600"/>
+            </a:xfrm>
+            <a:prstGeom prst="line">
+              <a:avLst/>
+            </a:prstGeom>
+            <a:ln>
+              <a:prstDash val="dashDot"/>
+            </a:ln>
+          </p:spPr>
+          <p:style>
+            <a:lnRef idx="3">
+              <a:schemeClr val="accent6"/>
+            </a:lnRef>
+            <a:fillRef idx="0">
+              <a:schemeClr val="accent6"/>
+            </a:fillRef>
+            <a:effectRef idx="2">
+              <a:schemeClr val="accent6"/>
+            </a:effectRef>
+            <a:fontRef idx="minor">
+              <a:schemeClr val="tx1"/>
+            </a:fontRef>
+          </p:style>
+        </p:cxnSp>
+        <p:cxnSp>
+          <p:nvCxnSpPr>
+            <p:cNvPr id="193" name="192 Conector recto"/>
+            <p:cNvCxnSpPr/>
+            <p:nvPr/>
+          </p:nvCxnSpPr>
+          <p:spPr>
+            <a:xfrm>
+              <a:off x="5695541" y="4191000"/>
+              <a:ext cx="4134259" cy="0"/>
+            </a:xfrm>
+            <a:prstGeom prst="line">
+              <a:avLst/>
+            </a:prstGeom>
+            <a:ln>
+              <a:prstDash val="dashDot"/>
+            </a:ln>
+          </p:spPr>
+          <p:style>
+            <a:lnRef idx="3">
+              <a:schemeClr val="accent6"/>
+            </a:lnRef>
+            <a:fillRef idx="0">
+              <a:schemeClr val="accent6"/>
+            </a:fillRef>
+            <a:effectRef idx="2">
+              <a:schemeClr val="accent6"/>
+            </a:effectRef>
+            <a:fontRef idx="minor">
+              <a:schemeClr val="tx1"/>
+            </a:fontRef>
+          </p:style>
+        </p:cxnSp>
+        <p:cxnSp>
+          <p:nvCxnSpPr>
+            <p:cNvPr id="194" name="193 Conector recto"/>
+            <p:cNvCxnSpPr/>
+            <p:nvPr/>
+          </p:nvCxnSpPr>
+          <p:spPr>
+            <a:xfrm>
+              <a:off x="5695541" y="6324600"/>
+              <a:ext cx="4060434" cy="0"/>
+            </a:xfrm>
+            <a:prstGeom prst="line">
+              <a:avLst/>
+            </a:prstGeom>
+            <a:ln>
+              <a:prstDash val="dashDot"/>
+            </a:ln>
+          </p:spPr>
+          <p:style>
+            <a:lnRef idx="3">
+              <a:schemeClr val="accent6"/>
+            </a:lnRef>
+            <a:fillRef idx="0">
+              <a:schemeClr val="accent6"/>
+            </a:fillRef>
+            <a:effectRef idx="2">
+              <a:schemeClr val="accent6"/>
+            </a:effectRef>
+            <a:fontRef idx="minor">
+              <a:schemeClr val="tx1"/>
+            </a:fontRef>
+          </p:style>
+        </p:cxnSp>
+        <p:cxnSp>
+          <p:nvCxnSpPr>
+            <p:cNvPr id="195" name="194 Conector recto"/>
+            <p:cNvCxnSpPr/>
+            <p:nvPr/>
+          </p:nvCxnSpPr>
+          <p:spPr>
+            <a:xfrm>
+              <a:off x="9755975" y="4191000"/>
+              <a:ext cx="0" cy="2133600"/>
+            </a:xfrm>
+            <a:prstGeom prst="line">
+              <a:avLst/>
+            </a:prstGeom>
+            <a:ln>
+              <a:prstDash val="dashDot"/>
+            </a:ln>
+          </p:spPr>
+          <p:style>
+            <a:lnRef idx="3">
+              <a:schemeClr val="accent6"/>
+            </a:lnRef>
+            <a:fillRef idx="0">
+              <a:schemeClr val="accent6"/>
+            </a:fillRef>
+            <a:effectRef idx="2">
+              <a:schemeClr val="accent6"/>
+            </a:effectRef>
+            <a:fontRef idx="minor">
+              <a:schemeClr val="tx1"/>
+            </a:fontRef>
+          </p:style>
+        </p:cxnSp>
+      </p:grpSp>
     </p:spTree>
     <p:extLst>
       <p:ext uri="{BB962C8B-B14F-4D97-AF65-F5344CB8AC3E}">

</xml_diff>